<commit_message>
tested icl on transcript analysis dataset, updated the way max_tokens is set and limited token size based on gpu constraints
</commit_message>
<xml_diff>
--- a/report/nlp_ppt.pptx
+++ b/report/nlp_ppt.pptx
@@ -4160,7 +4160,7 @@
           </a:ln>
           <a:extLst>
             <a:ext uri="{C572A759-6A51-4108-AA02-DFA0A04FC94B}">
-              <ma14:wrappingTextBoxFlag xmlns="" xmlns:m="http://schemas.openxmlformats.org/officeDocument/2006/math" xmlns:a14="http://schemas.microsoft.com/office/drawing/2010/main" xmlns:ma14="http://schemas.microsoft.com/office/mac/drawingml/2011/main" val="1"/>
+              <ma14:wrappingTextBoxFlag xmlns:ma14="http://schemas.microsoft.com/office/mac/drawingml/2011/main" xmlns:a14="http://schemas.microsoft.com/office/drawing/2010/main" xmlns:m="http://schemas.openxmlformats.org/officeDocument/2006/math" xmlns="" val="1"/>
             </a:ext>
           </a:extLst>
         </p:spPr>
@@ -4208,7 +4208,7 @@
           </a:ln>
           <a:extLst>
             <a:ext uri="{C572A759-6A51-4108-AA02-DFA0A04FC94B}">
-              <ma14:wrappingTextBoxFlag xmlns="" xmlns:m="http://schemas.openxmlformats.org/officeDocument/2006/math" xmlns:a14="http://schemas.microsoft.com/office/drawing/2010/main" xmlns:ma14="http://schemas.microsoft.com/office/mac/drawingml/2011/main" val="1"/>
+              <ma14:wrappingTextBoxFlag xmlns:ma14="http://schemas.microsoft.com/office/mac/drawingml/2011/main" xmlns:a14="http://schemas.microsoft.com/office/drawing/2010/main" xmlns:m="http://schemas.openxmlformats.org/officeDocument/2006/math" xmlns="" val="1"/>
             </a:ext>
           </a:extLst>
         </p:spPr>
@@ -4464,7 +4464,7 @@
           </a:ln>
           <a:extLst>
             <a:ext uri="{C572A759-6A51-4108-AA02-DFA0A04FC94B}">
-              <ma14:wrappingTextBoxFlag xmlns:ma14="http://schemas.microsoft.com/office/mac/drawingml/2011/main" xmlns:a14="http://schemas.microsoft.com/office/drawing/2010/main" xmlns:m="http://schemas.openxmlformats.org/officeDocument/2006/math" xmlns="" val="1"/>
+              <ma14:wrappingTextBoxFlag xmlns="" xmlns:m="http://schemas.openxmlformats.org/officeDocument/2006/math" xmlns:a14="http://schemas.microsoft.com/office/drawing/2010/main" xmlns:ma14="http://schemas.microsoft.com/office/mac/drawingml/2011/main" val="1"/>
             </a:ext>
           </a:extLst>
         </p:spPr>
@@ -4518,7 +4518,7 @@
           </a:ln>
           <a:extLst>
             <a:ext uri="{C572A759-6A51-4108-AA02-DFA0A04FC94B}">
-              <ma14:wrappingTextBoxFlag xmlns:ma14="http://schemas.microsoft.com/office/mac/drawingml/2011/main" xmlns:a14="http://schemas.microsoft.com/office/drawing/2010/main" xmlns:m="http://schemas.openxmlformats.org/officeDocument/2006/math" xmlns="" val="1"/>
+              <ma14:wrappingTextBoxFlag xmlns="" xmlns:m="http://schemas.openxmlformats.org/officeDocument/2006/math" xmlns:a14="http://schemas.microsoft.com/office/drawing/2010/main" xmlns:ma14="http://schemas.microsoft.com/office/mac/drawingml/2011/main" val="1"/>
             </a:ext>
           </a:extLst>
         </p:spPr>
@@ -4805,7 +4805,7 @@
           </a:ln>
           <a:extLst>
             <a:ext uri="{C572A759-6A51-4108-AA02-DFA0A04FC94B}">
-              <ma14:wrappingTextBoxFlag xmlns="" xmlns:m="http://schemas.openxmlformats.org/officeDocument/2006/math" xmlns:a14="http://schemas.microsoft.com/office/drawing/2010/main" xmlns:ma14="http://schemas.microsoft.com/office/mac/drawingml/2011/main" val="1"/>
+              <ma14:wrappingTextBoxFlag xmlns:ma14="http://schemas.microsoft.com/office/mac/drawingml/2011/main" xmlns:a14="http://schemas.microsoft.com/office/drawing/2010/main" xmlns:m="http://schemas.openxmlformats.org/officeDocument/2006/math" xmlns="" val="1"/>
             </a:ext>
           </a:extLst>
         </p:spPr>
@@ -4853,7 +4853,7 @@
           </a:ln>
           <a:extLst>
             <a:ext uri="{C572A759-6A51-4108-AA02-DFA0A04FC94B}">
-              <ma14:wrappingTextBoxFlag xmlns="" xmlns:m="http://schemas.openxmlformats.org/officeDocument/2006/math" xmlns:a14="http://schemas.microsoft.com/office/drawing/2010/main" xmlns:ma14="http://schemas.microsoft.com/office/mac/drawingml/2011/main" val="1"/>
+              <ma14:wrappingTextBoxFlag xmlns:ma14="http://schemas.microsoft.com/office/mac/drawingml/2011/main" xmlns:a14="http://schemas.microsoft.com/office/drawing/2010/main" xmlns:m="http://schemas.openxmlformats.org/officeDocument/2006/math" xmlns="" val="1"/>
             </a:ext>
           </a:extLst>
         </p:spPr>
@@ -5095,7 +5095,7 @@
           </a:ln>
           <a:extLst>
             <a:ext uri="{C572A759-6A51-4108-AA02-DFA0A04FC94B}">
-              <ma14:wrappingTextBoxFlag xmlns="" xmlns:m="http://schemas.openxmlformats.org/officeDocument/2006/math" xmlns:a14="http://schemas.microsoft.com/office/drawing/2010/main" xmlns:ma14="http://schemas.microsoft.com/office/mac/drawingml/2011/main" val="1"/>
+              <ma14:wrappingTextBoxFlag xmlns:ma14="http://schemas.microsoft.com/office/mac/drawingml/2011/main" xmlns:a14="http://schemas.microsoft.com/office/drawing/2010/main" xmlns:m="http://schemas.openxmlformats.org/officeDocument/2006/math" xmlns="" val="1"/>
             </a:ext>
           </a:extLst>
         </p:spPr>
@@ -5143,7 +5143,7 @@
           </a:ln>
           <a:extLst>
             <a:ext uri="{C572A759-6A51-4108-AA02-DFA0A04FC94B}">
-              <ma14:wrappingTextBoxFlag xmlns="" xmlns:m="http://schemas.openxmlformats.org/officeDocument/2006/math" xmlns:a14="http://schemas.microsoft.com/office/drawing/2010/main" xmlns:ma14="http://schemas.microsoft.com/office/mac/drawingml/2011/main" val="1"/>
+              <ma14:wrappingTextBoxFlag xmlns:ma14="http://schemas.microsoft.com/office/mac/drawingml/2011/main" xmlns:a14="http://schemas.microsoft.com/office/drawing/2010/main" xmlns:m="http://schemas.openxmlformats.org/officeDocument/2006/math" xmlns="" val="1"/>
             </a:ext>
           </a:extLst>
         </p:spPr>
@@ -5425,7 +5425,7 @@
           </a:ln>
           <a:extLst>
             <a:ext uri="{C572A759-6A51-4108-AA02-DFA0A04FC94B}">
-              <ma14:wrappingTextBoxFlag xmlns="" xmlns:m="http://schemas.openxmlformats.org/officeDocument/2006/math" xmlns:a14="http://schemas.microsoft.com/office/drawing/2010/main" xmlns:ma14="http://schemas.microsoft.com/office/mac/drawingml/2011/main" val="1"/>
+              <ma14:wrappingTextBoxFlag xmlns:ma14="http://schemas.microsoft.com/office/mac/drawingml/2011/main" xmlns:a14="http://schemas.microsoft.com/office/drawing/2010/main" xmlns:m="http://schemas.openxmlformats.org/officeDocument/2006/math" xmlns="" val="1"/>
             </a:ext>
           </a:extLst>
         </p:spPr>
@@ -5473,7 +5473,7 @@
           </a:ln>
           <a:extLst>
             <a:ext uri="{C572A759-6A51-4108-AA02-DFA0A04FC94B}">
-              <ma14:wrappingTextBoxFlag xmlns="" xmlns:m="http://schemas.openxmlformats.org/officeDocument/2006/math" xmlns:a14="http://schemas.microsoft.com/office/drawing/2010/main" xmlns:ma14="http://schemas.microsoft.com/office/mac/drawingml/2011/main" val="1"/>
+              <ma14:wrappingTextBoxFlag xmlns:ma14="http://schemas.microsoft.com/office/mac/drawingml/2011/main" xmlns:a14="http://schemas.microsoft.com/office/drawing/2010/main" xmlns:m="http://schemas.openxmlformats.org/officeDocument/2006/math" xmlns="" val="1"/>
             </a:ext>
           </a:extLst>
         </p:spPr>
@@ -5673,7 +5673,7 @@
           </a:ln>
           <a:extLst>
             <a:ext uri="{C572A759-6A51-4108-AA02-DFA0A04FC94B}">
-              <ma14:wrappingTextBoxFlag xmlns="" xmlns:m="http://schemas.openxmlformats.org/officeDocument/2006/math" xmlns:a14="http://schemas.microsoft.com/office/drawing/2010/main" xmlns:ma14="http://schemas.microsoft.com/office/mac/drawingml/2011/main" val="1"/>
+              <ma14:wrappingTextBoxFlag xmlns:ma14="http://schemas.microsoft.com/office/mac/drawingml/2011/main" xmlns:a14="http://schemas.microsoft.com/office/drawing/2010/main" xmlns:m="http://schemas.openxmlformats.org/officeDocument/2006/math" xmlns="" val="1"/>
             </a:ext>
           </a:extLst>
         </p:spPr>
@@ -5721,7 +5721,7 @@
           </a:ln>
           <a:extLst>
             <a:ext uri="{C572A759-6A51-4108-AA02-DFA0A04FC94B}">
-              <ma14:wrappingTextBoxFlag xmlns="" xmlns:m="http://schemas.openxmlformats.org/officeDocument/2006/math" xmlns:a14="http://schemas.microsoft.com/office/drawing/2010/main" xmlns:ma14="http://schemas.microsoft.com/office/mac/drawingml/2011/main" val="1"/>
+              <ma14:wrappingTextBoxFlag xmlns:ma14="http://schemas.microsoft.com/office/mac/drawingml/2011/main" xmlns:a14="http://schemas.microsoft.com/office/drawing/2010/main" xmlns:m="http://schemas.openxmlformats.org/officeDocument/2006/math" xmlns="" val="1"/>
             </a:ext>
           </a:extLst>
         </p:spPr>
@@ -6026,7 +6026,7 @@
           </a:ln>
           <a:extLst>
             <a:ext uri="{C572A759-6A51-4108-AA02-DFA0A04FC94B}">
-              <ma14:wrappingTextBoxFlag xmlns="" xmlns:m="http://schemas.openxmlformats.org/officeDocument/2006/math" xmlns:a14="http://schemas.microsoft.com/office/drawing/2010/main" xmlns:ma14="http://schemas.microsoft.com/office/mac/drawingml/2011/main" val="1"/>
+              <ma14:wrappingTextBoxFlag xmlns:ma14="http://schemas.microsoft.com/office/mac/drawingml/2011/main" xmlns:a14="http://schemas.microsoft.com/office/drawing/2010/main" xmlns:m="http://schemas.openxmlformats.org/officeDocument/2006/math" xmlns="" val="1"/>
             </a:ext>
           </a:extLst>
         </p:spPr>
@@ -6706,7 +6706,7 @@
             </a:r>
             <a:r>
               <a:rPr lang="en-US" sz="4400" dirty="0"/>
-              <a:t> Title</a:t>
+              <a:t> ICL</a:t>
             </a:r>
             <a:endParaRPr sz="4400" dirty="0"/>
           </a:p>
@@ -6772,7 +6772,7 @@
           </a:ln>
           <a:extLst>
             <a:ext uri="{C572A759-6A51-4108-AA02-DFA0A04FC94B}">
-              <ma14:wrappingTextBoxFlag xmlns="" xmlns:m="http://schemas.openxmlformats.org/officeDocument/2006/math" xmlns:a14="http://schemas.microsoft.com/office/drawing/2010/main" xmlns:ma14="http://schemas.microsoft.com/office/mac/drawingml/2011/main" val="1"/>
+              <ma14:wrappingTextBoxFlag xmlns:ma14="http://schemas.microsoft.com/office/mac/drawingml/2011/main" xmlns:a14="http://schemas.microsoft.com/office/drawing/2010/main" xmlns:m="http://schemas.openxmlformats.org/officeDocument/2006/math" xmlns="" val="1"/>
             </a:ext>
           </a:extLst>
         </p:spPr>
@@ -6880,10 +6880,10 @@
       </p:sp>
       <p:sp>
         <p:nvSpPr>
-          <p:cNvPr id="4" name="TextBox 3">
-            <a:extLst>
-              <a:ext uri="{FF2B5EF4-FFF2-40B4-BE49-F238E27FC236}">
-                <a16:creationId xmlns:a16="http://schemas.microsoft.com/office/drawing/2014/main" id="{7E555AC4-2787-C0B1-CCED-AC5A20E4228F}"/>
+          <p:cNvPr id="5" name="TextBox 4">
+            <a:extLst>
+              <a:ext uri="{FF2B5EF4-FFF2-40B4-BE49-F238E27FC236}">
+                <a16:creationId xmlns:a16="http://schemas.microsoft.com/office/drawing/2014/main" id="{99F985D8-48E6-2994-9836-BB5CAD544348}"/>
               </a:ext>
             </a:extLst>
           </p:cNvPr>
@@ -6892,8 +6892,8 @@
         </p:nvSpPr>
         <p:spPr>
           <a:xfrm>
-            <a:off x="609600" y="4145550"/>
-            <a:ext cx="3073758" cy="1477328"/>
+            <a:off x="4451796" y="2215165"/>
+            <a:ext cx="3211133" cy="1477328"/>
           </a:xfrm>
           <a:prstGeom prst="rect">
             <a:avLst/>
@@ -6913,161 +6913,7 @@
           <a:p>
             <a:r>
               <a:rPr lang="en-GB" b="1" dirty="0"/>
-              <a:t>Data</a:t>
-            </a:r>
-          </a:p>
-          <a:p>
-            <a:pPr marL="285750" indent="-285750">
-              <a:buFont typeface="Wingdings" panose="05000000000000000000" pitchFamily="2" charset="2"/>
-              <a:buChar char="§"/>
-            </a:pPr>
-            <a:r>
-              <a:rPr lang="en-GB" dirty="0"/>
-              <a:t>Point 1</a:t>
-            </a:r>
-          </a:p>
-          <a:p>
-            <a:pPr marL="285750" indent="-285750">
-              <a:buFont typeface="Wingdings" panose="05000000000000000000" pitchFamily="2" charset="2"/>
-              <a:buChar char="§"/>
-            </a:pPr>
-            <a:r>
-              <a:rPr lang="en-GB" dirty="0"/>
-              <a:t>Point 2</a:t>
-            </a:r>
-          </a:p>
-          <a:p>
-            <a:pPr marL="285750" indent="-285750">
-              <a:buFont typeface="Wingdings" panose="05000000000000000000" pitchFamily="2" charset="2"/>
-              <a:buChar char="§"/>
-            </a:pPr>
-            <a:r>
-              <a:rPr lang="en-GB" dirty="0"/>
-              <a:t>Point 3</a:t>
-            </a:r>
-          </a:p>
-          <a:p>
-            <a:pPr marL="285750" indent="-285750">
-              <a:buFont typeface="Wingdings" panose="05000000000000000000" pitchFamily="2" charset="2"/>
-              <a:buChar char="§"/>
-            </a:pPr>
-            <a:endParaRPr lang="en-GB" dirty="0"/>
-          </a:p>
-        </p:txBody>
-      </p:sp>
-      <p:sp>
-        <p:nvSpPr>
-          <p:cNvPr id="5" name="TextBox 4">
-            <a:extLst>
-              <a:ext uri="{FF2B5EF4-FFF2-40B4-BE49-F238E27FC236}">
-                <a16:creationId xmlns:a16="http://schemas.microsoft.com/office/drawing/2014/main" id="{99F985D8-48E6-2994-9836-BB5CAD544348}"/>
-              </a:ext>
-            </a:extLst>
-          </p:cNvPr>
-          <p:cNvSpPr txBox="1"/>
-          <p:nvPr/>
-        </p:nvSpPr>
-        <p:spPr>
-          <a:xfrm>
-            <a:off x="4451796" y="2215165"/>
-            <a:ext cx="3211133" cy="1477328"/>
-          </a:xfrm>
-          <a:prstGeom prst="rect">
-            <a:avLst/>
-          </a:prstGeom>
-          <a:noFill/>
-          <a:ln w="12700">
-            <a:solidFill>
-              <a:schemeClr val="tx1"/>
-            </a:solidFill>
-          </a:ln>
-        </p:spPr>
-        <p:txBody>
-          <a:bodyPr wrap="square" rtlCol="0">
-            <a:spAutoFit/>
-          </a:bodyPr>
-          <a:lstStyle/>
-          <a:p>
-            <a:r>
-              <a:rPr lang="en-GB" b="1" dirty="0"/>
               <a:t>Models</a:t>
-            </a:r>
-          </a:p>
-          <a:p>
-            <a:pPr marL="285750" indent="-285750">
-              <a:buFont typeface="Wingdings" panose="05000000000000000000" pitchFamily="2" charset="2"/>
-              <a:buChar char="§"/>
-            </a:pPr>
-            <a:r>
-              <a:rPr lang="en-GB" dirty="0"/>
-              <a:t>Point 1</a:t>
-            </a:r>
-          </a:p>
-          <a:p>
-            <a:pPr marL="285750" indent="-285750">
-              <a:buFont typeface="Wingdings" panose="05000000000000000000" pitchFamily="2" charset="2"/>
-              <a:buChar char="§"/>
-            </a:pPr>
-            <a:r>
-              <a:rPr lang="en-GB" dirty="0"/>
-              <a:t>Point 2</a:t>
-            </a:r>
-          </a:p>
-          <a:p>
-            <a:pPr marL="285750" indent="-285750">
-              <a:buFont typeface="Wingdings" panose="05000000000000000000" pitchFamily="2" charset="2"/>
-              <a:buChar char="§"/>
-            </a:pPr>
-            <a:r>
-              <a:rPr lang="en-GB" dirty="0"/>
-              <a:t>Point 3</a:t>
-            </a:r>
-          </a:p>
-          <a:p>
-            <a:pPr marL="285750" indent="-285750">
-              <a:buFont typeface="Wingdings" panose="05000000000000000000" pitchFamily="2" charset="2"/>
-              <a:buChar char="§"/>
-            </a:pPr>
-            <a:endParaRPr lang="en-GB" dirty="0"/>
-          </a:p>
-        </p:txBody>
-      </p:sp>
-      <p:sp>
-        <p:nvSpPr>
-          <p:cNvPr id="6" name="TextBox 5">
-            <a:extLst>
-              <a:ext uri="{FF2B5EF4-FFF2-40B4-BE49-F238E27FC236}">
-                <a16:creationId xmlns:a16="http://schemas.microsoft.com/office/drawing/2014/main" id="{8CDD4B89-1E75-D9E4-5222-536304DE1F2D}"/>
-              </a:ext>
-            </a:extLst>
-          </p:cNvPr>
-          <p:cNvSpPr txBox="1"/>
-          <p:nvPr/>
-        </p:nvSpPr>
-        <p:spPr>
-          <a:xfrm>
-            <a:off x="4426038" y="4146445"/>
-            <a:ext cx="3211132" cy="1477328"/>
-          </a:xfrm>
-          <a:prstGeom prst="rect">
-            <a:avLst/>
-          </a:prstGeom>
-          <a:noFill/>
-          <a:ln w="12700">
-            <a:solidFill>
-              <a:schemeClr val="tx1"/>
-            </a:solidFill>
-          </a:ln>
-        </p:spPr>
-        <p:txBody>
-          <a:bodyPr wrap="square" rtlCol="0">
-            <a:spAutoFit/>
-          </a:bodyPr>
-          <a:lstStyle/>
-          <a:p>
-            <a:r>
-              <a:rPr lang="en-GB" b="1" dirty="0"/>
-              <a:t>Results</a:t>
             </a:r>
           </a:p>
           <a:p>
@@ -7206,6 +7052,36 @@
           <a:xfrm>
             <a:off x="8907754" y="2537870"/>
             <a:ext cx="2198255" cy="2770909"/>
+          </a:xfrm>
+          <a:prstGeom prst="rect">
+            <a:avLst/>
+          </a:prstGeom>
+        </p:spPr>
+      </p:pic>
+      <p:pic>
+        <p:nvPicPr>
+          <p:cNvPr id="8" name="Picture 7">
+            <a:extLst>
+              <a:ext uri="{FF2B5EF4-FFF2-40B4-BE49-F238E27FC236}">
+                <a16:creationId xmlns:a16="http://schemas.microsoft.com/office/drawing/2014/main" id="{22405DD6-F775-2046-D61F-FBB51380B45A}"/>
+              </a:ext>
+            </a:extLst>
+          </p:cNvPr>
+          <p:cNvPicPr>
+            <a:picLocks noChangeAspect="1"/>
+          </p:cNvPicPr>
+          <p:nvPr/>
+        </p:nvPicPr>
+        <p:blipFill>
+          <a:blip r:embed="rId4"/>
+          <a:stretch>
+            <a:fillRect/>
+          </a:stretch>
+        </p:blipFill>
+        <p:spPr>
+          <a:xfrm>
+            <a:off x="0" y="3162632"/>
+            <a:ext cx="12192000" cy="3510502"/>
           </a:xfrm>
           <a:prstGeom prst="rect">
             <a:avLst/>
@@ -7294,7 +7170,7 @@
             </a:r>
             <a:r>
               <a:rPr lang="en-US" sz="4400" dirty="0"/>
-              <a:t> Title</a:t>
+              <a:t> Comparing ICL vs IT</a:t>
             </a:r>
             <a:endParaRPr sz="4400" dirty="0"/>
           </a:p>
@@ -7360,7 +7236,7 @@
           </a:ln>
           <a:extLst>
             <a:ext uri="{C572A759-6A51-4108-AA02-DFA0A04FC94B}">
-              <ma14:wrappingTextBoxFlag xmlns="" xmlns:m="http://schemas.openxmlformats.org/officeDocument/2006/math" xmlns:a14="http://schemas.microsoft.com/office/drawing/2010/main" xmlns:ma14="http://schemas.microsoft.com/office/mac/drawingml/2011/main" val="1"/>
+              <ma14:wrappingTextBoxFlag xmlns:ma14="http://schemas.microsoft.com/office/mac/drawingml/2011/main" xmlns:a14="http://schemas.microsoft.com/office/drawing/2010/main" xmlns:m="http://schemas.openxmlformats.org/officeDocument/2006/math" xmlns="" val="1"/>
             </a:ext>
           </a:extLst>
         </p:spPr>
@@ -7391,10 +7267,10 @@
       </p:sp>
       <p:sp>
         <p:nvSpPr>
-          <p:cNvPr id="3" name="TextBox 2">
-            <a:extLst>
-              <a:ext uri="{FF2B5EF4-FFF2-40B4-BE49-F238E27FC236}">
-                <a16:creationId xmlns:a16="http://schemas.microsoft.com/office/drawing/2014/main" id="{AA30DB0C-BFAE-8DF0-2583-C97C57A67D21}"/>
+          <p:cNvPr id="2" name="TextBox 1">
+            <a:extLst>
+              <a:ext uri="{FF2B5EF4-FFF2-40B4-BE49-F238E27FC236}">
+                <a16:creationId xmlns:a16="http://schemas.microsoft.com/office/drawing/2014/main" id="{338DAF13-9423-9D64-018E-CB7483155C95}"/>
               </a:ext>
             </a:extLst>
           </p:cNvPr>
@@ -7403,18 +7279,13 @@
         </p:nvSpPr>
         <p:spPr>
           <a:xfrm>
-            <a:off x="661115" y="2235502"/>
-            <a:ext cx="3073758" cy="1477328"/>
+            <a:off x="609600" y="2743200"/>
+            <a:ext cx="5486400" cy="1200329"/>
           </a:xfrm>
           <a:prstGeom prst="rect">
             <a:avLst/>
           </a:prstGeom>
           <a:noFill/>
-          <a:ln w="12700">
-            <a:solidFill>
-              <a:schemeClr val="tx1"/>
-            </a:solidFill>
-          </a:ln>
         </p:spPr>
         <p:txBody>
           <a:bodyPr wrap="square" rtlCol="0">
@@ -7423,383 +7294,32 @@
           <a:lstStyle/>
           <a:p>
             <a:r>
-              <a:rPr lang="en-GB" b="1" dirty="0"/>
-              <a:t>Experiment</a:t>
+              <a:rPr lang="en-GB" dirty="0"/>
+              <a:t>Qualitative Comparison:</a:t>
             </a:r>
           </a:p>
           <a:p>
             <a:pPr marL="285750" indent="-285750">
-              <a:buFont typeface="Wingdings" panose="05000000000000000000" pitchFamily="2" charset="2"/>
-              <a:buChar char="§"/>
+              <a:buFont typeface="Arial" panose="020B0604020202020204" pitchFamily="34" charset="0"/>
+              <a:buChar char="•"/>
             </a:pPr>
             <a:r>
               <a:rPr lang="en-GB" dirty="0"/>
-              <a:t>Point 1</a:t>
+              <a:t>ICL at perform time is much more computationally expensive</a:t>
             </a:r>
           </a:p>
           <a:p>
             <a:pPr marL="285750" indent="-285750">
-              <a:buFont typeface="Wingdings" panose="05000000000000000000" pitchFamily="2" charset="2"/>
-              <a:buChar char="§"/>
+              <a:buFont typeface="Arial" panose="020B0604020202020204" pitchFamily="34" charset="0"/>
+              <a:buChar char="•"/>
             </a:pPr>
             <a:r>
               <a:rPr lang="en-GB" dirty="0"/>
-              <a:t>Point 2</a:t>
-            </a:r>
-          </a:p>
-          <a:p>
-            <a:pPr marL="285750" indent="-285750">
-              <a:buFont typeface="Wingdings" panose="05000000000000000000" pitchFamily="2" charset="2"/>
-              <a:buChar char="§"/>
-            </a:pPr>
-            <a:r>
-              <a:rPr lang="en-GB" dirty="0"/>
-              <a:t>Point 3</a:t>
-            </a:r>
-          </a:p>
-          <a:p>
-            <a:pPr marL="285750" indent="-285750">
-              <a:buFont typeface="Wingdings" panose="05000000000000000000" pitchFamily="2" charset="2"/>
-              <a:buChar char="§"/>
-            </a:pPr>
-            <a:endParaRPr lang="en-GB" dirty="0"/>
-          </a:p>
-        </p:txBody>
-      </p:sp>
-      <p:sp>
-        <p:nvSpPr>
-          <p:cNvPr id="4" name="TextBox 3">
-            <a:extLst>
-              <a:ext uri="{FF2B5EF4-FFF2-40B4-BE49-F238E27FC236}">
-                <a16:creationId xmlns:a16="http://schemas.microsoft.com/office/drawing/2014/main" id="{7E555AC4-2787-C0B1-CCED-AC5A20E4228F}"/>
-              </a:ext>
-            </a:extLst>
-          </p:cNvPr>
-          <p:cNvSpPr txBox="1"/>
-          <p:nvPr/>
-        </p:nvSpPr>
-        <p:spPr>
-          <a:xfrm>
-            <a:off x="609600" y="4145550"/>
-            <a:ext cx="3073758" cy="1477328"/>
-          </a:xfrm>
-          <a:prstGeom prst="rect">
-            <a:avLst/>
-          </a:prstGeom>
-          <a:noFill/>
-          <a:ln w="12700">
-            <a:solidFill>
-              <a:schemeClr val="tx1"/>
-            </a:solidFill>
-          </a:ln>
-        </p:spPr>
-        <p:txBody>
-          <a:bodyPr wrap="square" rtlCol="0">
-            <a:spAutoFit/>
-          </a:bodyPr>
-          <a:lstStyle/>
-          <a:p>
-            <a:r>
-              <a:rPr lang="en-GB" b="1" dirty="0"/>
-              <a:t>Data</a:t>
-            </a:r>
-          </a:p>
-          <a:p>
-            <a:pPr marL="285750" indent="-285750">
-              <a:buFont typeface="Wingdings" panose="05000000000000000000" pitchFamily="2" charset="2"/>
-              <a:buChar char="§"/>
-            </a:pPr>
-            <a:r>
-              <a:rPr lang="en-GB" dirty="0"/>
-              <a:t>Point 1</a:t>
-            </a:r>
-          </a:p>
-          <a:p>
-            <a:pPr marL="285750" indent="-285750">
-              <a:buFont typeface="Wingdings" panose="05000000000000000000" pitchFamily="2" charset="2"/>
-              <a:buChar char="§"/>
-            </a:pPr>
-            <a:r>
-              <a:rPr lang="en-GB" dirty="0"/>
-              <a:t>Point 2</a:t>
-            </a:r>
-          </a:p>
-          <a:p>
-            <a:pPr marL="285750" indent="-285750">
-              <a:buFont typeface="Wingdings" panose="05000000000000000000" pitchFamily="2" charset="2"/>
-              <a:buChar char="§"/>
-            </a:pPr>
-            <a:r>
-              <a:rPr lang="en-GB" dirty="0"/>
-              <a:t>Point 3</a:t>
-            </a:r>
-          </a:p>
-          <a:p>
-            <a:pPr marL="285750" indent="-285750">
-              <a:buFont typeface="Wingdings" panose="05000000000000000000" pitchFamily="2" charset="2"/>
-              <a:buChar char="§"/>
-            </a:pPr>
-            <a:endParaRPr lang="en-GB" dirty="0"/>
-          </a:p>
-        </p:txBody>
-      </p:sp>
-      <p:sp>
-        <p:nvSpPr>
-          <p:cNvPr id="5" name="TextBox 4">
-            <a:extLst>
-              <a:ext uri="{FF2B5EF4-FFF2-40B4-BE49-F238E27FC236}">
-                <a16:creationId xmlns:a16="http://schemas.microsoft.com/office/drawing/2014/main" id="{99F985D8-48E6-2994-9836-BB5CAD544348}"/>
-              </a:ext>
-            </a:extLst>
-          </p:cNvPr>
-          <p:cNvSpPr txBox="1"/>
-          <p:nvPr/>
-        </p:nvSpPr>
-        <p:spPr>
-          <a:xfrm>
-            <a:off x="4451796" y="2215165"/>
-            <a:ext cx="3211133" cy="1477328"/>
-          </a:xfrm>
-          <a:prstGeom prst="rect">
-            <a:avLst/>
-          </a:prstGeom>
-          <a:noFill/>
-          <a:ln w="12700">
-            <a:solidFill>
-              <a:schemeClr val="tx1"/>
-            </a:solidFill>
-          </a:ln>
-        </p:spPr>
-        <p:txBody>
-          <a:bodyPr wrap="square" rtlCol="0">
-            <a:spAutoFit/>
-          </a:bodyPr>
-          <a:lstStyle/>
-          <a:p>
-            <a:r>
-              <a:rPr lang="en-GB" b="1" dirty="0"/>
-              <a:t>Models</a:t>
-            </a:r>
-          </a:p>
-          <a:p>
-            <a:pPr marL="285750" indent="-285750">
-              <a:buFont typeface="Wingdings" panose="05000000000000000000" pitchFamily="2" charset="2"/>
-              <a:buChar char="§"/>
-            </a:pPr>
-            <a:r>
-              <a:rPr lang="en-GB" dirty="0"/>
-              <a:t>Point 1</a:t>
-            </a:r>
-          </a:p>
-          <a:p>
-            <a:pPr marL="285750" indent="-285750">
-              <a:buFont typeface="Wingdings" panose="05000000000000000000" pitchFamily="2" charset="2"/>
-              <a:buChar char="§"/>
-            </a:pPr>
-            <a:r>
-              <a:rPr lang="en-GB" dirty="0"/>
-              <a:t>Point 2</a:t>
-            </a:r>
-          </a:p>
-          <a:p>
-            <a:pPr marL="285750" indent="-285750">
-              <a:buFont typeface="Wingdings" panose="05000000000000000000" pitchFamily="2" charset="2"/>
-              <a:buChar char="§"/>
-            </a:pPr>
-            <a:r>
-              <a:rPr lang="en-GB" dirty="0"/>
-              <a:t>Point 3</a:t>
-            </a:r>
-          </a:p>
-          <a:p>
-            <a:pPr marL="285750" indent="-285750">
-              <a:buFont typeface="Wingdings" panose="05000000000000000000" pitchFamily="2" charset="2"/>
-              <a:buChar char="§"/>
-            </a:pPr>
-            <a:endParaRPr lang="en-GB" dirty="0"/>
-          </a:p>
-        </p:txBody>
-      </p:sp>
-      <p:sp>
-        <p:nvSpPr>
-          <p:cNvPr id="6" name="TextBox 5">
-            <a:extLst>
-              <a:ext uri="{FF2B5EF4-FFF2-40B4-BE49-F238E27FC236}">
-                <a16:creationId xmlns:a16="http://schemas.microsoft.com/office/drawing/2014/main" id="{8CDD4B89-1E75-D9E4-5222-536304DE1F2D}"/>
-              </a:ext>
-            </a:extLst>
-          </p:cNvPr>
-          <p:cNvSpPr txBox="1"/>
-          <p:nvPr/>
-        </p:nvSpPr>
-        <p:spPr>
-          <a:xfrm>
-            <a:off x="4426038" y="4146445"/>
-            <a:ext cx="3211132" cy="1477328"/>
-          </a:xfrm>
-          <a:prstGeom prst="rect">
-            <a:avLst/>
-          </a:prstGeom>
-          <a:noFill/>
-          <a:ln w="12700">
-            <a:solidFill>
-              <a:schemeClr val="tx1"/>
-            </a:solidFill>
-          </a:ln>
-        </p:spPr>
-        <p:txBody>
-          <a:bodyPr wrap="square" rtlCol="0">
-            <a:spAutoFit/>
-          </a:bodyPr>
-          <a:lstStyle/>
-          <a:p>
-            <a:r>
-              <a:rPr lang="en-GB" b="1" dirty="0"/>
-              <a:t>Results</a:t>
-            </a:r>
-          </a:p>
-          <a:p>
-            <a:pPr marL="285750" indent="-285750">
-              <a:buFont typeface="Wingdings" panose="05000000000000000000" pitchFamily="2" charset="2"/>
-              <a:buChar char="§"/>
-            </a:pPr>
-            <a:r>
-              <a:rPr lang="en-GB" dirty="0"/>
-              <a:t>Point 1</a:t>
-            </a:r>
-          </a:p>
-          <a:p>
-            <a:pPr marL="285750" indent="-285750">
-              <a:buFont typeface="Wingdings" panose="05000000000000000000" pitchFamily="2" charset="2"/>
-              <a:buChar char="§"/>
-            </a:pPr>
-            <a:r>
-              <a:rPr lang="en-GB" dirty="0"/>
-              <a:t>Point 2</a:t>
-            </a:r>
-          </a:p>
-          <a:p>
-            <a:pPr marL="285750" indent="-285750">
-              <a:buFont typeface="Wingdings" panose="05000000000000000000" pitchFamily="2" charset="2"/>
-              <a:buChar char="§"/>
-            </a:pPr>
-            <a:r>
-              <a:rPr lang="en-GB" dirty="0"/>
-              <a:t>Point 3</a:t>
-            </a:r>
-          </a:p>
-          <a:p>
-            <a:pPr marL="285750" indent="-285750">
-              <a:buFont typeface="Wingdings" panose="05000000000000000000" pitchFamily="2" charset="2"/>
-              <a:buChar char="§"/>
-            </a:pPr>
-            <a:endParaRPr lang="en-GB" dirty="0"/>
-          </a:p>
-        </p:txBody>
-      </p:sp>
-      <p:sp>
-        <p:nvSpPr>
-          <p:cNvPr id="7" name="TextBox 6">
-            <a:extLst>
-              <a:ext uri="{FF2B5EF4-FFF2-40B4-BE49-F238E27FC236}">
-                <a16:creationId xmlns:a16="http://schemas.microsoft.com/office/drawing/2014/main" id="{B0A816A3-9A6B-AA00-687D-57C6E5BA1397}"/>
-              </a:ext>
-            </a:extLst>
-          </p:cNvPr>
-          <p:cNvSpPr txBox="1"/>
-          <p:nvPr/>
-        </p:nvSpPr>
-        <p:spPr>
-          <a:xfrm>
-            <a:off x="8379851" y="2215165"/>
-            <a:ext cx="3254063" cy="3416320"/>
-          </a:xfrm>
-          <a:prstGeom prst="rect">
-            <a:avLst/>
-          </a:prstGeom>
-          <a:noFill/>
-          <a:ln w="12700">
-            <a:solidFill>
-              <a:schemeClr val="tx1"/>
-            </a:solidFill>
-          </a:ln>
-        </p:spPr>
-        <p:txBody>
-          <a:bodyPr wrap="square" rtlCol="0">
-            <a:spAutoFit/>
-          </a:bodyPr>
-          <a:lstStyle/>
-          <a:p>
-            <a:r>
-              <a:rPr lang="en-GB" b="1" dirty="0"/>
-              <a:t>Graph/Table</a:t>
-            </a:r>
-          </a:p>
-          <a:p>
-            <a:endParaRPr lang="en-GB" b="1" dirty="0"/>
-          </a:p>
-          <a:p>
-            <a:endParaRPr lang="en-GB" b="1" dirty="0"/>
-          </a:p>
-          <a:p>
-            <a:endParaRPr lang="en-GB" b="1" dirty="0"/>
-          </a:p>
-          <a:p>
-            <a:endParaRPr lang="en-GB" b="1" dirty="0"/>
-          </a:p>
-          <a:p>
-            <a:endParaRPr lang="en-GB" b="1" dirty="0"/>
-          </a:p>
-          <a:p>
-            <a:endParaRPr lang="en-GB" b="1" dirty="0"/>
-          </a:p>
-          <a:p>
-            <a:endParaRPr lang="en-GB" b="1" dirty="0"/>
-          </a:p>
-          <a:p>
-            <a:endParaRPr lang="en-GB" b="1" dirty="0"/>
-          </a:p>
-          <a:p>
-            <a:endParaRPr lang="en-GB" b="1" dirty="0"/>
-          </a:p>
-          <a:p>
-            <a:endParaRPr lang="en-GB" b="1" dirty="0"/>
-          </a:p>
-          <a:p>
-            <a:endParaRPr lang="en-GB" b="1" dirty="0"/>
-          </a:p>
-        </p:txBody>
-      </p:sp>
-      <p:pic>
-        <p:nvPicPr>
-          <p:cNvPr id="11" name="Picture 10">
-            <a:extLst>
-              <a:ext uri="{FF2B5EF4-FFF2-40B4-BE49-F238E27FC236}">
-                <a16:creationId xmlns:a16="http://schemas.microsoft.com/office/drawing/2014/main" id="{9237CF71-5A42-892C-4B81-616C6D79AE99}"/>
-              </a:ext>
-            </a:extLst>
-          </p:cNvPr>
-          <p:cNvPicPr>
-            <a:picLocks noChangeAspect="1"/>
-          </p:cNvPicPr>
-          <p:nvPr/>
-        </p:nvPicPr>
-        <p:blipFill>
-          <a:blip r:embed="rId3"/>
-          <a:stretch>
-            <a:fillRect/>
-          </a:stretch>
-        </p:blipFill>
-        <p:spPr>
-          <a:xfrm>
-            <a:off x="8907754" y="2537870"/>
-            <a:ext cx="2198255" cy="2770909"/>
-          </a:xfrm>
-          <a:prstGeom prst="rect">
-            <a:avLst/>
-          </a:prstGeom>
-        </p:spPr>
-      </p:pic>
+              <a:t>ICL does not require training</a:t>
+            </a:r>
+          </a:p>
+        </p:txBody>
+      </p:sp>
     </p:spTree>
     <p:extLst>
       <p:ext uri="{BB962C8B-B14F-4D97-AF65-F5344CB8AC3E}">
@@ -7940,7 +7460,7 @@
           </a:ln>
           <a:extLst>
             <a:ext uri="{C572A759-6A51-4108-AA02-DFA0A04FC94B}">
-              <ma14:wrappingTextBoxFlag xmlns="" xmlns:m="http://schemas.openxmlformats.org/officeDocument/2006/math" xmlns:a14="http://schemas.microsoft.com/office/drawing/2010/main" xmlns:ma14="http://schemas.microsoft.com/office/mac/drawingml/2011/main" val="1"/>
+              <ma14:wrappingTextBoxFlag xmlns:ma14="http://schemas.microsoft.com/office/mac/drawingml/2011/main" xmlns:a14="http://schemas.microsoft.com/office/drawing/2010/main" xmlns:m="http://schemas.openxmlformats.org/officeDocument/2006/math" xmlns="" val="1"/>
             </a:ext>
           </a:extLst>
         </p:spPr>
@@ -7988,7 +7508,7 @@
           </a:ln>
           <a:extLst>
             <a:ext uri="{C572A759-6A51-4108-AA02-DFA0A04FC94B}">
-              <ma14:wrappingTextBoxFlag xmlns="" xmlns:m="http://schemas.openxmlformats.org/officeDocument/2006/math" xmlns:a14="http://schemas.microsoft.com/office/drawing/2010/main" xmlns:ma14="http://schemas.microsoft.com/office/mac/drawingml/2011/main" val="1"/>
+              <ma14:wrappingTextBoxFlag xmlns:ma14="http://schemas.microsoft.com/office/mac/drawingml/2011/main" xmlns:a14="http://schemas.microsoft.com/office/drawing/2010/main" xmlns:m="http://schemas.openxmlformats.org/officeDocument/2006/math" xmlns="" val="1"/>
             </a:ext>
           </a:extLst>
         </p:spPr>

</xml_diff>

<commit_message>
updated natural instructions evaluation to test on multiple tasks
</commit_message>
<xml_diff>
--- a/report/nlp_ppt.pptx
+++ b/report/nlp_ppt.pptx
@@ -4160,7 +4160,7 @@
           </a:ln>
           <a:extLst>
             <a:ext uri="{C572A759-6A51-4108-AA02-DFA0A04FC94B}">
-              <ma14:wrappingTextBoxFlag xmlns:ma14="http://schemas.microsoft.com/office/mac/drawingml/2011/main" xmlns:a14="http://schemas.microsoft.com/office/drawing/2010/main" xmlns:m="http://schemas.openxmlformats.org/officeDocument/2006/math" xmlns="" val="1"/>
+              <ma14:wrappingTextBoxFlag xmlns="" xmlns:m="http://schemas.openxmlformats.org/officeDocument/2006/math" xmlns:a14="http://schemas.microsoft.com/office/drawing/2010/main" xmlns:ma14="http://schemas.microsoft.com/office/mac/drawingml/2011/main" val="1"/>
             </a:ext>
           </a:extLst>
         </p:spPr>
@@ -4208,7 +4208,7 @@
           </a:ln>
           <a:extLst>
             <a:ext uri="{C572A759-6A51-4108-AA02-DFA0A04FC94B}">
-              <ma14:wrappingTextBoxFlag xmlns:ma14="http://schemas.microsoft.com/office/mac/drawingml/2011/main" xmlns:a14="http://schemas.microsoft.com/office/drawing/2010/main" xmlns:m="http://schemas.openxmlformats.org/officeDocument/2006/math" xmlns="" val="1"/>
+              <ma14:wrappingTextBoxFlag xmlns="" xmlns:m="http://schemas.openxmlformats.org/officeDocument/2006/math" xmlns:a14="http://schemas.microsoft.com/office/drawing/2010/main" xmlns:ma14="http://schemas.microsoft.com/office/mac/drawingml/2011/main" val="1"/>
             </a:ext>
           </a:extLst>
         </p:spPr>
@@ -4464,7 +4464,7 @@
           </a:ln>
           <a:extLst>
             <a:ext uri="{C572A759-6A51-4108-AA02-DFA0A04FC94B}">
-              <ma14:wrappingTextBoxFlag xmlns="" xmlns:m="http://schemas.openxmlformats.org/officeDocument/2006/math" xmlns:a14="http://schemas.microsoft.com/office/drawing/2010/main" xmlns:ma14="http://schemas.microsoft.com/office/mac/drawingml/2011/main" val="1"/>
+              <ma14:wrappingTextBoxFlag xmlns:ma14="http://schemas.microsoft.com/office/mac/drawingml/2011/main" xmlns:a14="http://schemas.microsoft.com/office/drawing/2010/main" xmlns:m="http://schemas.openxmlformats.org/officeDocument/2006/math" xmlns="" val="1"/>
             </a:ext>
           </a:extLst>
         </p:spPr>
@@ -4518,7 +4518,7 @@
           </a:ln>
           <a:extLst>
             <a:ext uri="{C572A759-6A51-4108-AA02-DFA0A04FC94B}">
-              <ma14:wrappingTextBoxFlag xmlns="" xmlns:m="http://schemas.openxmlformats.org/officeDocument/2006/math" xmlns:a14="http://schemas.microsoft.com/office/drawing/2010/main" xmlns:ma14="http://schemas.microsoft.com/office/mac/drawingml/2011/main" val="1"/>
+              <ma14:wrappingTextBoxFlag xmlns:ma14="http://schemas.microsoft.com/office/mac/drawingml/2011/main" xmlns:a14="http://schemas.microsoft.com/office/drawing/2010/main" xmlns:m="http://schemas.openxmlformats.org/officeDocument/2006/math" xmlns="" val="1"/>
             </a:ext>
           </a:extLst>
         </p:spPr>
@@ -4542,7 +4542,7 @@
               </a:defRPr>
             </a:pPr>
             <a:r>
-              <a:rPr sz="1750"/>
+              <a:rPr sz="1750" dirty="0"/>
               <a:t>Point 1</a:t>
             </a:r>
           </a:p>
@@ -4561,7 +4561,7 @@
               </a:defRPr>
             </a:pPr>
             <a:r>
-              <a:rPr sz="1750"/>
+              <a:rPr sz="1750" dirty="0"/>
               <a:t>Sub-point 1</a:t>
             </a:r>
           </a:p>
@@ -4580,7 +4580,7 @@
               </a:defRPr>
             </a:pPr>
             <a:r>
-              <a:rPr sz="1750"/>
+              <a:rPr sz="1750" dirty="0"/>
               <a:t>Sub-point 2</a:t>
             </a:r>
           </a:p>
@@ -4599,7 +4599,7 @@
               </a:defRPr>
             </a:pPr>
             <a:r>
-              <a:rPr sz="1750"/>
+              <a:rPr sz="1750" dirty="0"/>
               <a:t>Sub-point 3</a:t>
             </a:r>
           </a:p>
@@ -4618,7 +4618,7 @@
               </a:defRPr>
             </a:pPr>
             <a:r>
-              <a:rPr sz="1750"/>
+              <a:rPr sz="1750" dirty="0"/>
               <a:t>Point 2</a:t>
             </a:r>
           </a:p>
@@ -4637,7 +4637,7 @@
               </a:defRPr>
             </a:pPr>
             <a:r>
-              <a:rPr sz="1750"/>
+              <a:rPr sz="1750" dirty="0"/>
               <a:t>Sub-point 1</a:t>
             </a:r>
           </a:p>
@@ -4656,7 +4656,7 @@
               </a:defRPr>
             </a:pPr>
             <a:r>
-              <a:rPr sz="1750"/>
+              <a:rPr sz="1750" dirty="0"/>
               <a:t>Sub-point 2</a:t>
             </a:r>
           </a:p>
@@ -4675,8 +4675,47 @@
               </a:defRPr>
             </a:pPr>
             <a:r>
-              <a:rPr sz="1750"/>
+              <a:rPr sz="1750" dirty="0"/>
               <a:t>Sub-point 3</a:t>
+            </a:r>
+          </a:p>
+        </p:txBody>
+      </p:sp>
+      <p:sp>
+        <p:nvSpPr>
+          <p:cNvPr id="2" name="TextBox 1">
+            <a:extLst>
+              <a:ext uri="{FF2B5EF4-FFF2-40B4-BE49-F238E27FC236}">
+                <a16:creationId xmlns:a16="http://schemas.microsoft.com/office/drawing/2014/main" id="{C5B7199E-A81C-FF0C-9672-2EEC3D8A265D}"/>
+              </a:ext>
+            </a:extLst>
+          </p:cNvPr>
+          <p:cNvSpPr txBox="1"/>
+          <p:nvPr/>
+        </p:nvSpPr>
+        <p:spPr>
+          <a:xfrm>
+            <a:off x="5273336" y="3187083"/>
+            <a:ext cx="6045693" cy="369332"/>
+          </a:xfrm>
+          <a:prstGeom prst="rect">
+            <a:avLst/>
+          </a:prstGeom>
+          <a:noFill/>
+        </p:spPr>
+        <p:txBody>
+          <a:bodyPr wrap="square" rtlCol="0">
+            <a:spAutoFit/>
+          </a:bodyPr>
+          <a:lstStyle/>
+          <a:p>
+            <a:r>
+              <a:rPr lang="en-GB" dirty="0"/>
+              <a:t>Confident in GPT2 vs Mistral ICL </a:t>
+            </a:r>
+            <a:r>
+              <a:rPr lang="en-GB"/>
+              <a:t>Natural Instructions</a:t>
             </a:r>
           </a:p>
         </p:txBody>
@@ -4805,7 +4844,7 @@
           </a:ln>
           <a:extLst>
             <a:ext uri="{C572A759-6A51-4108-AA02-DFA0A04FC94B}">
-              <ma14:wrappingTextBoxFlag xmlns:ma14="http://schemas.microsoft.com/office/mac/drawingml/2011/main" xmlns:a14="http://schemas.microsoft.com/office/drawing/2010/main" xmlns:m="http://schemas.openxmlformats.org/officeDocument/2006/math" xmlns="" val="1"/>
+              <ma14:wrappingTextBoxFlag xmlns="" xmlns:m="http://schemas.openxmlformats.org/officeDocument/2006/math" xmlns:a14="http://schemas.microsoft.com/office/drawing/2010/main" xmlns:ma14="http://schemas.microsoft.com/office/mac/drawingml/2011/main" val="1"/>
             </a:ext>
           </a:extLst>
         </p:spPr>
@@ -4853,7 +4892,7 @@
           </a:ln>
           <a:extLst>
             <a:ext uri="{C572A759-6A51-4108-AA02-DFA0A04FC94B}">
-              <ma14:wrappingTextBoxFlag xmlns:ma14="http://schemas.microsoft.com/office/mac/drawingml/2011/main" xmlns:a14="http://schemas.microsoft.com/office/drawing/2010/main" xmlns:m="http://schemas.openxmlformats.org/officeDocument/2006/math" xmlns="" val="1"/>
+              <ma14:wrappingTextBoxFlag xmlns="" xmlns:m="http://schemas.openxmlformats.org/officeDocument/2006/math" xmlns:a14="http://schemas.microsoft.com/office/drawing/2010/main" xmlns:ma14="http://schemas.microsoft.com/office/mac/drawingml/2011/main" val="1"/>
             </a:ext>
           </a:extLst>
         </p:spPr>
@@ -5095,7 +5134,7 @@
           </a:ln>
           <a:extLst>
             <a:ext uri="{C572A759-6A51-4108-AA02-DFA0A04FC94B}">
-              <ma14:wrappingTextBoxFlag xmlns:ma14="http://schemas.microsoft.com/office/mac/drawingml/2011/main" xmlns:a14="http://schemas.microsoft.com/office/drawing/2010/main" xmlns:m="http://schemas.openxmlformats.org/officeDocument/2006/math" xmlns="" val="1"/>
+              <ma14:wrappingTextBoxFlag xmlns="" xmlns:m="http://schemas.openxmlformats.org/officeDocument/2006/math" xmlns:a14="http://schemas.microsoft.com/office/drawing/2010/main" xmlns:ma14="http://schemas.microsoft.com/office/mac/drawingml/2011/main" val="1"/>
             </a:ext>
           </a:extLst>
         </p:spPr>
@@ -5143,7 +5182,7 @@
           </a:ln>
           <a:extLst>
             <a:ext uri="{C572A759-6A51-4108-AA02-DFA0A04FC94B}">
-              <ma14:wrappingTextBoxFlag xmlns:ma14="http://schemas.microsoft.com/office/mac/drawingml/2011/main" xmlns:a14="http://schemas.microsoft.com/office/drawing/2010/main" xmlns:m="http://schemas.openxmlformats.org/officeDocument/2006/math" xmlns="" val="1"/>
+              <ma14:wrappingTextBoxFlag xmlns="" xmlns:m="http://schemas.openxmlformats.org/officeDocument/2006/math" xmlns:a14="http://schemas.microsoft.com/office/drawing/2010/main" xmlns:ma14="http://schemas.microsoft.com/office/mac/drawingml/2011/main" val="1"/>
             </a:ext>
           </a:extLst>
         </p:spPr>
@@ -5425,7 +5464,7 @@
           </a:ln>
           <a:extLst>
             <a:ext uri="{C572A759-6A51-4108-AA02-DFA0A04FC94B}">
-              <ma14:wrappingTextBoxFlag xmlns:ma14="http://schemas.microsoft.com/office/mac/drawingml/2011/main" xmlns:a14="http://schemas.microsoft.com/office/drawing/2010/main" xmlns:m="http://schemas.openxmlformats.org/officeDocument/2006/math" xmlns="" val="1"/>
+              <ma14:wrappingTextBoxFlag xmlns="" xmlns:m="http://schemas.openxmlformats.org/officeDocument/2006/math" xmlns:a14="http://schemas.microsoft.com/office/drawing/2010/main" xmlns:ma14="http://schemas.microsoft.com/office/mac/drawingml/2011/main" val="1"/>
             </a:ext>
           </a:extLst>
         </p:spPr>
@@ -5473,7 +5512,7 @@
           </a:ln>
           <a:extLst>
             <a:ext uri="{C572A759-6A51-4108-AA02-DFA0A04FC94B}">
-              <ma14:wrappingTextBoxFlag xmlns:ma14="http://schemas.microsoft.com/office/mac/drawingml/2011/main" xmlns:a14="http://schemas.microsoft.com/office/drawing/2010/main" xmlns:m="http://schemas.openxmlformats.org/officeDocument/2006/math" xmlns="" val="1"/>
+              <ma14:wrappingTextBoxFlag xmlns="" xmlns:m="http://schemas.openxmlformats.org/officeDocument/2006/math" xmlns:a14="http://schemas.microsoft.com/office/drawing/2010/main" xmlns:ma14="http://schemas.microsoft.com/office/mac/drawingml/2011/main" val="1"/>
             </a:ext>
           </a:extLst>
         </p:spPr>
@@ -5673,7 +5712,7 @@
           </a:ln>
           <a:extLst>
             <a:ext uri="{C572A759-6A51-4108-AA02-DFA0A04FC94B}">
-              <ma14:wrappingTextBoxFlag xmlns:ma14="http://schemas.microsoft.com/office/mac/drawingml/2011/main" xmlns:a14="http://schemas.microsoft.com/office/drawing/2010/main" xmlns:m="http://schemas.openxmlformats.org/officeDocument/2006/math" xmlns="" val="1"/>
+              <ma14:wrappingTextBoxFlag xmlns="" xmlns:m="http://schemas.openxmlformats.org/officeDocument/2006/math" xmlns:a14="http://schemas.microsoft.com/office/drawing/2010/main" xmlns:ma14="http://schemas.microsoft.com/office/mac/drawingml/2011/main" val="1"/>
             </a:ext>
           </a:extLst>
         </p:spPr>
@@ -5721,7 +5760,7 @@
           </a:ln>
           <a:extLst>
             <a:ext uri="{C572A759-6A51-4108-AA02-DFA0A04FC94B}">
-              <ma14:wrappingTextBoxFlag xmlns:ma14="http://schemas.microsoft.com/office/mac/drawingml/2011/main" xmlns:a14="http://schemas.microsoft.com/office/drawing/2010/main" xmlns:m="http://schemas.openxmlformats.org/officeDocument/2006/math" xmlns="" val="1"/>
+              <ma14:wrappingTextBoxFlag xmlns="" xmlns:m="http://schemas.openxmlformats.org/officeDocument/2006/math" xmlns:a14="http://schemas.microsoft.com/office/drawing/2010/main" xmlns:ma14="http://schemas.microsoft.com/office/mac/drawingml/2011/main" val="1"/>
             </a:ext>
           </a:extLst>
         </p:spPr>
@@ -6026,7 +6065,7 @@
           </a:ln>
           <a:extLst>
             <a:ext uri="{C572A759-6A51-4108-AA02-DFA0A04FC94B}">
-              <ma14:wrappingTextBoxFlag xmlns:ma14="http://schemas.microsoft.com/office/mac/drawingml/2011/main" xmlns:a14="http://schemas.microsoft.com/office/drawing/2010/main" xmlns:m="http://schemas.openxmlformats.org/officeDocument/2006/math" xmlns="" val="1"/>
+              <ma14:wrappingTextBoxFlag xmlns="" xmlns:m="http://schemas.openxmlformats.org/officeDocument/2006/math" xmlns:a14="http://schemas.microsoft.com/office/drawing/2010/main" xmlns:ma14="http://schemas.microsoft.com/office/mac/drawingml/2011/main" val="1"/>
             </a:ext>
           </a:extLst>
         </p:spPr>
@@ -6772,7 +6811,7 @@
           </a:ln>
           <a:extLst>
             <a:ext uri="{C572A759-6A51-4108-AA02-DFA0A04FC94B}">
-              <ma14:wrappingTextBoxFlag xmlns:ma14="http://schemas.microsoft.com/office/mac/drawingml/2011/main" xmlns:a14="http://schemas.microsoft.com/office/drawing/2010/main" xmlns:m="http://schemas.openxmlformats.org/officeDocument/2006/math" xmlns="" val="1"/>
+              <ma14:wrappingTextBoxFlag xmlns="" xmlns:m="http://schemas.openxmlformats.org/officeDocument/2006/math" xmlns:a14="http://schemas.microsoft.com/office/drawing/2010/main" xmlns:ma14="http://schemas.microsoft.com/office/mac/drawingml/2011/main" val="1"/>
             </a:ext>
           </a:extLst>
         </p:spPr>
@@ -7236,7 +7275,7 @@
           </a:ln>
           <a:extLst>
             <a:ext uri="{C572A759-6A51-4108-AA02-DFA0A04FC94B}">
-              <ma14:wrappingTextBoxFlag xmlns:ma14="http://schemas.microsoft.com/office/mac/drawingml/2011/main" xmlns:a14="http://schemas.microsoft.com/office/drawing/2010/main" xmlns:m="http://schemas.openxmlformats.org/officeDocument/2006/math" xmlns="" val="1"/>
+              <ma14:wrappingTextBoxFlag xmlns="" xmlns:m="http://schemas.openxmlformats.org/officeDocument/2006/math" xmlns:a14="http://schemas.microsoft.com/office/drawing/2010/main" xmlns:ma14="http://schemas.microsoft.com/office/mac/drawingml/2011/main" val="1"/>
             </a:ext>
           </a:extLst>
         </p:spPr>
@@ -7460,7 +7499,7 @@
           </a:ln>
           <a:extLst>
             <a:ext uri="{C572A759-6A51-4108-AA02-DFA0A04FC94B}">
-              <ma14:wrappingTextBoxFlag xmlns:ma14="http://schemas.microsoft.com/office/mac/drawingml/2011/main" xmlns:a14="http://schemas.microsoft.com/office/drawing/2010/main" xmlns:m="http://schemas.openxmlformats.org/officeDocument/2006/math" xmlns="" val="1"/>
+              <ma14:wrappingTextBoxFlag xmlns="" xmlns:m="http://schemas.openxmlformats.org/officeDocument/2006/math" xmlns:a14="http://schemas.microsoft.com/office/drawing/2010/main" xmlns:ma14="http://schemas.microsoft.com/office/mac/drawingml/2011/main" val="1"/>
             </a:ext>
           </a:extLst>
         </p:spPr>
@@ -7508,7 +7547,7 @@
           </a:ln>
           <a:extLst>
             <a:ext uri="{C572A759-6A51-4108-AA02-DFA0A04FC94B}">
-              <ma14:wrappingTextBoxFlag xmlns:ma14="http://schemas.microsoft.com/office/mac/drawingml/2011/main" xmlns:a14="http://schemas.microsoft.com/office/drawing/2010/main" xmlns:m="http://schemas.openxmlformats.org/officeDocument/2006/math" xmlns="" val="1"/>
+              <ma14:wrappingTextBoxFlag xmlns="" xmlns:m="http://schemas.openxmlformats.org/officeDocument/2006/math" xmlns:a14="http://schemas.microsoft.com/office/drawing/2010/main" xmlns:ma14="http://schemas.microsoft.com/office/mac/drawingml/2011/main" val="1"/>
             </a:ext>
           </a:extLst>
         </p:spPr>

</xml_diff>

<commit_message>
ICL results complete for similarity
</commit_message>
<xml_diff>
--- a/report/nlp_ppt.pptx
+++ b/report/nlp_ppt.pptx
@@ -4160,7 +4160,7 @@
           </a:ln>
           <a:extLst>
             <a:ext uri="{C572A759-6A51-4108-AA02-DFA0A04FC94B}">
-              <ma14:wrappingTextBoxFlag xmlns="" xmlns:m="http://schemas.openxmlformats.org/officeDocument/2006/math" xmlns:a14="http://schemas.microsoft.com/office/drawing/2010/main" xmlns:ma14="http://schemas.microsoft.com/office/mac/drawingml/2011/main" val="1"/>
+              <ma14:wrappingTextBoxFlag xmlns:ma14="http://schemas.microsoft.com/office/mac/drawingml/2011/main" xmlns:a14="http://schemas.microsoft.com/office/drawing/2010/main" xmlns:m="http://schemas.openxmlformats.org/officeDocument/2006/math" xmlns="" val="1"/>
             </a:ext>
           </a:extLst>
         </p:spPr>
@@ -4208,7 +4208,7 @@
           </a:ln>
           <a:extLst>
             <a:ext uri="{C572A759-6A51-4108-AA02-DFA0A04FC94B}">
-              <ma14:wrappingTextBoxFlag xmlns="" xmlns:m="http://schemas.openxmlformats.org/officeDocument/2006/math" xmlns:a14="http://schemas.microsoft.com/office/drawing/2010/main" xmlns:ma14="http://schemas.microsoft.com/office/mac/drawingml/2011/main" val="1"/>
+              <ma14:wrappingTextBoxFlag xmlns:ma14="http://schemas.microsoft.com/office/mac/drawingml/2011/main" xmlns:a14="http://schemas.microsoft.com/office/drawing/2010/main" xmlns:m="http://schemas.openxmlformats.org/officeDocument/2006/math" xmlns="" val="1"/>
             </a:ext>
           </a:extLst>
         </p:spPr>
@@ -4464,7 +4464,7 @@
           </a:ln>
           <a:extLst>
             <a:ext uri="{C572A759-6A51-4108-AA02-DFA0A04FC94B}">
-              <ma14:wrappingTextBoxFlag xmlns:ma14="http://schemas.microsoft.com/office/mac/drawingml/2011/main" xmlns:a14="http://schemas.microsoft.com/office/drawing/2010/main" xmlns:m="http://schemas.openxmlformats.org/officeDocument/2006/math" xmlns="" val="1"/>
+              <ma14:wrappingTextBoxFlag xmlns="" xmlns:m="http://schemas.openxmlformats.org/officeDocument/2006/math" xmlns:a14="http://schemas.microsoft.com/office/drawing/2010/main" xmlns:ma14="http://schemas.microsoft.com/office/mac/drawingml/2011/main" val="1"/>
             </a:ext>
           </a:extLst>
         </p:spPr>
@@ -4518,7 +4518,7 @@
           </a:ln>
           <a:extLst>
             <a:ext uri="{C572A759-6A51-4108-AA02-DFA0A04FC94B}">
-              <ma14:wrappingTextBoxFlag xmlns:ma14="http://schemas.microsoft.com/office/mac/drawingml/2011/main" xmlns:a14="http://schemas.microsoft.com/office/drawing/2010/main" xmlns:m="http://schemas.openxmlformats.org/officeDocument/2006/math" xmlns="" val="1"/>
+              <ma14:wrappingTextBoxFlag xmlns="" xmlns:m="http://schemas.openxmlformats.org/officeDocument/2006/math" xmlns:a14="http://schemas.microsoft.com/office/drawing/2010/main" xmlns:ma14="http://schemas.microsoft.com/office/mac/drawingml/2011/main" val="1"/>
             </a:ext>
           </a:extLst>
         </p:spPr>
@@ -4711,11 +4711,7 @@
           <a:p>
             <a:r>
               <a:rPr lang="en-GB" dirty="0"/>
-              <a:t>Confident in GPT2 vs Mistral ICL </a:t>
-            </a:r>
-            <a:r>
-              <a:rPr lang="en-GB"/>
-              <a:t>Natural Instructions</a:t>
+              <a:t>Confident in GPT2 vs Mistral ICL Natural Instructions</a:t>
             </a:r>
           </a:p>
         </p:txBody>
@@ -4844,7 +4840,7 @@
           </a:ln>
           <a:extLst>
             <a:ext uri="{C572A759-6A51-4108-AA02-DFA0A04FC94B}">
-              <ma14:wrappingTextBoxFlag xmlns="" xmlns:m="http://schemas.openxmlformats.org/officeDocument/2006/math" xmlns:a14="http://schemas.microsoft.com/office/drawing/2010/main" xmlns:ma14="http://schemas.microsoft.com/office/mac/drawingml/2011/main" val="1"/>
+              <ma14:wrappingTextBoxFlag xmlns:ma14="http://schemas.microsoft.com/office/mac/drawingml/2011/main" xmlns:a14="http://schemas.microsoft.com/office/drawing/2010/main" xmlns:m="http://schemas.openxmlformats.org/officeDocument/2006/math" xmlns="" val="1"/>
             </a:ext>
           </a:extLst>
         </p:spPr>
@@ -4892,7 +4888,7 @@
           </a:ln>
           <a:extLst>
             <a:ext uri="{C572A759-6A51-4108-AA02-DFA0A04FC94B}">
-              <ma14:wrappingTextBoxFlag xmlns="" xmlns:m="http://schemas.openxmlformats.org/officeDocument/2006/math" xmlns:a14="http://schemas.microsoft.com/office/drawing/2010/main" xmlns:ma14="http://schemas.microsoft.com/office/mac/drawingml/2011/main" val="1"/>
+              <ma14:wrappingTextBoxFlag xmlns:ma14="http://schemas.microsoft.com/office/mac/drawingml/2011/main" xmlns:a14="http://schemas.microsoft.com/office/drawing/2010/main" xmlns:m="http://schemas.openxmlformats.org/officeDocument/2006/math" xmlns="" val="1"/>
             </a:ext>
           </a:extLst>
         </p:spPr>
@@ -5134,7 +5130,7 @@
           </a:ln>
           <a:extLst>
             <a:ext uri="{C572A759-6A51-4108-AA02-DFA0A04FC94B}">
-              <ma14:wrappingTextBoxFlag xmlns="" xmlns:m="http://schemas.openxmlformats.org/officeDocument/2006/math" xmlns:a14="http://schemas.microsoft.com/office/drawing/2010/main" xmlns:ma14="http://schemas.microsoft.com/office/mac/drawingml/2011/main" val="1"/>
+              <ma14:wrappingTextBoxFlag xmlns:ma14="http://schemas.microsoft.com/office/mac/drawingml/2011/main" xmlns:a14="http://schemas.microsoft.com/office/drawing/2010/main" xmlns:m="http://schemas.openxmlformats.org/officeDocument/2006/math" xmlns="" val="1"/>
             </a:ext>
           </a:extLst>
         </p:spPr>
@@ -5182,7 +5178,7 @@
           </a:ln>
           <a:extLst>
             <a:ext uri="{C572A759-6A51-4108-AA02-DFA0A04FC94B}">
-              <ma14:wrappingTextBoxFlag xmlns="" xmlns:m="http://schemas.openxmlformats.org/officeDocument/2006/math" xmlns:a14="http://schemas.microsoft.com/office/drawing/2010/main" xmlns:ma14="http://schemas.microsoft.com/office/mac/drawingml/2011/main" val="1"/>
+              <ma14:wrappingTextBoxFlag xmlns:ma14="http://schemas.microsoft.com/office/mac/drawingml/2011/main" xmlns:a14="http://schemas.microsoft.com/office/drawing/2010/main" xmlns:m="http://schemas.openxmlformats.org/officeDocument/2006/math" xmlns="" val="1"/>
             </a:ext>
           </a:extLst>
         </p:spPr>
@@ -5464,7 +5460,7 @@
           </a:ln>
           <a:extLst>
             <a:ext uri="{C572A759-6A51-4108-AA02-DFA0A04FC94B}">
-              <ma14:wrappingTextBoxFlag xmlns="" xmlns:m="http://schemas.openxmlformats.org/officeDocument/2006/math" xmlns:a14="http://schemas.microsoft.com/office/drawing/2010/main" xmlns:ma14="http://schemas.microsoft.com/office/mac/drawingml/2011/main" val="1"/>
+              <ma14:wrappingTextBoxFlag xmlns:ma14="http://schemas.microsoft.com/office/mac/drawingml/2011/main" xmlns:a14="http://schemas.microsoft.com/office/drawing/2010/main" xmlns:m="http://schemas.openxmlformats.org/officeDocument/2006/math" xmlns="" val="1"/>
             </a:ext>
           </a:extLst>
         </p:spPr>
@@ -5512,7 +5508,7 @@
           </a:ln>
           <a:extLst>
             <a:ext uri="{C572A759-6A51-4108-AA02-DFA0A04FC94B}">
-              <ma14:wrappingTextBoxFlag xmlns="" xmlns:m="http://schemas.openxmlformats.org/officeDocument/2006/math" xmlns:a14="http://schemas.microsoft.com/office/drawing/2010/main" xmlns:ma14="http://schemas.microsoft.com/office/mac/drawingml/2011/main" val="1"/>
+              <ma14:wrappingTextBoxFlag xmlns:ma14="http://schemas.microsoft.com/office/mac/drawingml/2011/main" xmlns:a14="http://schemas.microsoft.com/office/drawing/2010/main" xmlns:m="http://schemas.openxmlformats.org/officeDocument/2006/math" xmlns="" val="1"/>
             </a:ext>
           </a:extLst>
         </p:spPr>
@@ -5712,7 +5708,7 @@
           </a:ln>
           <a:extLst>
             <a:ext uri="{C572A759-6A51-4108-AA02-DFA0A04FC94B}">
-              <ma14:wrappingTextBoxFlag xmlns="" xmlns:m="http://schemas.openxmlformats.org/officeDocument/2006/math" xmlns:a14="http://schemas.microsoft.com/office/drawing/2010/main" xmlns:ma14="http://schemas.microsoft.com/office/mac/drawingml/2011/main" val="1"/>
+              <ma14:wrappingTextBoxFlag xmlns:ma14="http://schemas.microsoft.com/office/mac/drawingml/2011/main" xmlns:a14="http://schemas.microsoft.com/office/drawing/2010/main" xmlns:m="http://schemas.openxmlformats.org/officeDocument/2006/math" xmlns="" val="1"/>
             </a:ext>
           </a:extLst>
         </p:spPr>
@@ -5760,7 +5756,7 @@
           </a:ln>
           <a:extLst>
             <a:ext uri="{C572A759-6A51-4108-AA02-DFA0A04FC94B}">
-              <ma14:wrappingTextBoxFlag xmlns="" xmlns:m="http://schemas.openxmlformats.org/officeDocument/2006/math" xmlns:a14="http://schemas.microsoft.com/office/drawing/2010/main" xmlns:ma14="http://schemas.microsoft.com/office/mac/drawingml/2011/main" val="1"/>
+              <ma14:wrappingTextBoxFlag xmlns:ma14="http://schemas.microsoft.com/office/mac/drawingml/2011/main" xmlns:a14="http://schemas.microsoft.com/office/drawing/2010/main" xmlns:m="http://schemas.openxmlformats.org/officeDocument/2006/math" xmlns="" val="1"/>
             </a:ext>
           </a:extLst>
         </p:spPr>
@@ -6065,7 +6061,7 @@
           </a:ln>
           <a:extLst>
             <a:ext uri="{C572A759-6A51-4108-AA02-DFA0A04FC94B}">
-              <ma14:wrappingTextBoxFlag xmlns="" xmlns:m="http://schemas.openxmlformats.org/officeDocument/2006/math" xmlns:a14="http://schemas.microsoft.com/office/drawing/2010/main" xmlns:ma14="http://schemas.microsoft.com/office/mac/drawingml/2011/main" val="1"/>
+              <ma14:wrappingTextBoxFlag xmlns:ma14="http://schemas.microsoft.com/office/mac/drawingml/2011/main" xmlns:a14="http://schemas.microsoft.com/office/drawing/2010/main" xmlns:m="http://schemas.openxmlformats.org/officeDocument/2006/math" xmlns="" val="1"/>
             </a:ext>
           </a:extLst>
         </p:spPr>
@@ -6811,7 +6807,7 @@
           </a:ln>
           <a:extLst>
             <a:ext uri="{C572A759-6A51-4108-AA02-DFA0A04FC94B}">
-              <ma14:wrappingTextBoxFlag xmlns="" xmlns:m="http://schemas.openxmlformats.org/officeDocument/2006/math" xmlns:a14="http://schemas.microsoft.com/office/drawing/2010/main" xmlns:ma14="http://schemas.microsoft.com/office/mac/drawingml/2011/main" val="1"/>
+              <ma14:wrappingTextBoxFlag xmlns:ma14="http://schemas.microsoft.com/office/mac/drawingml/2011/main" xmlns:a14="http://schemas.microsoft.com/office/drawing/2010/main" xmlns:m="http://schemas.openxmlformats.org/officeDocument/2006/math" xmlns="" val="1"/>
             </a:ext>
           </a:extLst>
         </p:spPr>
@@ -7275,7 +7271,7 @@
           </a:ln>
           <a:extLst>
             <a:ext uri="{C572A759-6A51-4108-AA02-DFA0A04FC94B}">
-              <ma14:wrappingTextBoxFlag xmlns="" xmlns:m="http://schemas.openxmlformats.org/officeDocument/2006/math" xmlns:a14="http://schemas.microsoft.com/office/drawing/2010/main" xmlns:ma14="http://schemas.microsoft.com/office/mac/drawingml/2011/main" val="1"/>
+              <ma14:wrappingTextBoxFlag xmlns:ma14="http://schemas.microsoft.com/office/mac/drawingml/2011/main" xmlns:a14="http://schemas.microsoft.com/office/drawing/2010/main" xmlns:m="http://schemas.openxmlformats.org/officeDocument/2006/math" xmlns="" val="1"/>
             </a:ext>
           </a:extLst>
         </p:spPr>
@@ -7499,7 +7495,7 @@
           </a:ln>
           <a:extLst>
             <a:ext uri="{C572A759-6A51-4108-AA02-DFA0A04FC94B}">
-              <ma14:wrappingTextBoxFlag xmlns="" xmlns:m="http://schemas.openxmlformats.org/officeDocument/2006/math" xmlns:a14="http://schemas.microsoft.com/office/drawing/2010/main" xmlns:ma14="http://schemas.microsoft.com/office/mac/drawingml/2011/main" val="1"/>
+              <ma14:wrappingTextBoxFlag xmlns:ma14="http://schemas.microsoft.com/office/mac/drawingml/2011/main" xmlns:a14="http://schemas.microsoft.com/office/drawing/2010/main" xmlns:m="http://schemas.openxmlformats.org/officeDocument/2006/math" xmlns="" val="1"/>
             </a:ext>
           </a:extLst>
         </p:spPr>
@@ -7547,7 +7543,7 @@
           </a:ln>
           <a:extLst>
             <a:ext uri="{C572A759-6A51-4108-AA02-DFA0A04FC94B}">
-              <ma14:wrappingTextBoxFlag xmlns="" xmlns:m="http://schemas.openxmlformats.org/officeDocument/2006/math" xmlns:a14="http://schemas.microsoft.com/office/drawing/2010/main" xmlns:ma14="http://schemas.microsoft.com/office/mac/drawingml/2011/main" val="1"/>
+              <ma14:wrappingTextBoxFlag xmlns:ma14="http://schemas.microsoft.com/office/mac/drawingml/2011/main" xmlns:a14="http://schemas.microsoft.com/office/drawing/2010/main" xmlns:m="http://schemas.openxmlformats.org/officeDocument/2006/math" xmlns="" val="1"/>
             </a:ext>
           </a:extLst>
         </p:spPr>

</xml_diff>